<commit_message>
update the experiment guidance
add the function of hiding text
</commit_message>
<xml_diff>
--- a/pre-exp-file/Name-SID.pptx
+++ b/pre-exp-file/Name-SID.pptx
@@ -200,7 +200,7 @@
           <a:p>
             <a:fld id="{B11DB170-9AF5-4E23-B1EA-D309BB190CD3}" type="datetimeFigureOut">
               <a:rPr lang="zh-Hans-HK" altLang="en-US" smtClean="0"/>
-              <a:t>16/3/2020</a:t>
+              <a:t>19/3/2020</a:t>
             </a:fld>
             <a:endParaRPr lang="zh-Hans-HK" altLang="en-US"/>
           </a:p>
@@ -742,7 +742,7 @@
           <a:p>
             <a:fld id="{F96CB9E5-BD50-4F43-8F74-0DACF91C00DD}" type="datetimeFigureOut">
               <a:rPr lang="zh-Hans-HK" altLang="en-US" smtClean="0"/>
-              <a:t>16/3/2020</a:t>
+              <a:t>19/3/2020</a:t>
             </a:fld>
             <a:endParaRPr lang="zh-Hans-HK" altLang="en-US"/>
           </a:p>
@@ -942,7 +942,7 @@
           <a:p>
             <a:fld id="{F96CB9E5-BD50-4F43-8F74-0DACF91C00DD}" type="datetimeFigureOut">
               <a:rPr lang="zh-Hans-HK" altLang="en-US" smtClean="0"/>
-              <a:t>16/3/2020</a:t>
+              <a:t>19/3/2020</a:t>
             </a:fld>
             <a:endParaRPr lang="zh-Hans-HK" altLang="en-US"/>
           </a:p>
@@ -1152,7 +1152,7 @@
           <a:p>
             <a:fld id="{F96CB9E5-BD50-4F43-8F74-0DACF91C00DD}" type="datetimeFigureOut">
               <a:rPr lang="zh-Hans-HK" altLang="en-US" smtClean="0"/>
-              <a:t>16/3/2020</a:t>
+              <a:t>19/3/2020</a:t>
             </a:fld>
             <a:endParaRPr lang="zh-Hans-HK" altLang="en-US"/>
           </a:p>
@@ -1352,7 +1352,7 @@
           <a:p>
             <a:fld id="{F96CB9E5-BD50-4F43-8F74-0DACF91C00DD}" type="datetimeFigureOut">
               <a:rPr lang="zh-Hans-HK" altLang="en-US" smtClean="0"/>
-              <a:t>16/3/2020</a:t>
+              <a:t>19/3/2020</a:t>
             </a:fld>
             <a:endParaRPr lang="zh-Hans-HK" altLang="en-US"/>
           </a:p>
@@ -1628,7 +1628,7 @@
           <a:p>
             <a:fld id="{F96CB9E5-BD50-4F43-8F74-0DACF91C00DD}" type="datetimeFigureOut">
               <a:rPr lang="zh-Hans-HK" altLang="en-US" smtClean="0"/>
-              <a:t>16/3/2020</a:t>
+              <a:t>19/3/2020</a:t>
             </a:fld>
             <a:endParaRPr lang="zh-Hans-HK" altLang="en-US"/>
           </a:p>
@@ -1896,7 +1896,7 @@
           <a:p>
             <a:fld id="{F96CB9E5-BD50-4F43-8F74-0DACF91C00DD}" type="datetimeFigureOut">
               <a:rPr lang="zh-Hans-HK" altLang="en-US" smtClean="0"/>
-              <a:t>16/3/2020</a:t>
+              <a:t>19/3/2020</a:t>
             </a:fld>
             <a:endParaRPr lang="zh-Hans-HK" altLang="en-US"/>
           </a:p>
@@ -2311,7 +2311,7 @@
           <a:p>
             <a:fld id="{F96CB9E5-BD50-4F43-8F74-0DACF91C00DD}" type="datetimeFigureOut">
               <a:rPr lang="zh-Hans-HK" altLang="en-US" smtClean="0"/>
-              <a:t>16/3/2020</a:t>
+              <a:t>19/3/2020</a:t>
             </a:fld>
             <a:endParaRPr lang="zh-Hans-HK" altLang="en-US"/>
           </a:p>
@@ -2453,7 +2453,7 @@
           <a:p>
             <a:fld id="{F96CB9E5-BD50-4F43-8F74-0DACF91C00DD}" type="datetimeFigureOut">
               <a:rPr lang="zh-Hans-HK" altLang="en-US" smtClean="0"/>
-              <a:t>16/3/2020</a:t>
+              <a:t>19/3/2020</a:t>
             </a:fld>
             <a:endParaRPr lang="zh-Hans-HK" altLang="en-US"/>
           </a:p>
@@ -2566,7 +2566,7 @@
           <a:p>
             <a:fld id="{F96CB9E5-BD50-4F43-8F74-0DACF91C00DD}" type="datetimeFigureOut">
               <a:rPr lang="zh-Hans-HK" altLang="en-US" smtClean="0"/>
-              <a:t>16/3/2020</a:t>
+              <a:t>19/3/2020</a:t>
             </a:fld>
             <a:endParaRPr lang="zh-Hans-HK" altLang="en-US"/>
           </a:p>
@@ -2879,7 +2879,7 @@
           <a:p>
             <a:fld id="{F96CB9E5-BD50-4F43-8F74-0DACF91C00DD}" type="datetimeFigureOut">
               <a:rPr lang="zh-Hans-HK" altLang="en-US" smtClean="0"/>
-              <a:t>16/3/2020</a:t>
+              <a:t>19/3/2020</a:t>
             </a:fld>
             <a:endParaRPr lang="zh-Hans-HK" altLang="en-US"/>
           </a:p>
@@ -3168,7 +3168,7 @@
           <a:p>
             <a:fld id="{F96CB9E5-BD50-4F43-8F74-0DACF91C00DD}" type="datetimeFigureOut">
               <a:rPr lang="zh-Hans-HK" altLang="en-US" smtClean="0"/>
-              <a:t>16/3/2020</a:t>
+              <a:t>19/3/2020</a:t>
             </a:fld>
             <a:endParaRPr lang="zh-Hans-HK" altLang="en-US"/>
           </a:p>
@@ -3411,7 +3411,7 @@
           <a:p>
             <a:fld id="{F96CB9E5-BD50-4F43-8F74-0DACF91C00DD}" type="datetimeFigureOut">
               <a:rPr lang="zh-Hans-HK" altLang="en-US" smtClean="0"/>
-              <a:t>16/3/2020</a:t>
+              <a:t>19/3/2020</a:t>
             </a:fld>
             <a:endParaRPr lang="zh-Hans-HK" altLang="en-US"/>
           </a:p>
@@ -3851,7 +3851,7 @@
           <a:p>
             <a:r>
               <a:rPr lang="en-US" altLang="zh-Hans-HK" dirty="0"/>
-              <a:t>Your slide</a:t>
+              <a:t>Influence Flower</a:t>
             </a:r>
             <a:endParaRPr lang="zh-Hans-HK" altLang="en-US" dirty="0"/>
           </a:p>
@@ -3905,11 +3905,11 @@
   <p:clrMapOvr>
     <a:masterClrMapping/>
   </p:clrMapOvr>
-  <mc:AlternateContent xmlns:mc="http://schemas.openxmlformats.org/markup-compatibility/2006">
-    <mc:Choice xmlns:p14="http://schemas.microsoft.com/office/powerpoint/2010/main" Requires="p14">
+  <mc:AlternateContent xmlns:mc="http://schemas.openxmlformats.org/markup-compatibility/2006" xmlns:p14="http://schemas.microsoft.com/office/powerpoint/2010/main">
+    <mc:Choice Requires="p14">
       <p:transition spd="slow" p14:dur="2000" advTm="3604"/>
     </mc:Choice>
-    <mc:Fallback>
+    <mc:Fallback xmlns="">
       <p:transition spd="slow" advTm="3604"/>
     </mc:Fallback>
   </mc:AlternateContent>
@@ -4138,11 +4138,11 @@
   <p:clrMapOvr>
     <a:masterClrMapping/>
   </p:clrMapOvr>
-  <mc:AlternateContent xmlns:mc="http://schemas.openxmlformats.org/markup-compatibility/2006">
-    <mc:Choice xmlns:p14="http://schemas.microsoft.com/office/powerpoint/2010/main" Requires="p14">
+  <mc:AlternateContent xmlns:mc="http://schemas.openxmlformats.org/markup-compatibility/2006" xmlns:p14="http://schemas.microsoft.com/office/powerpoint/2010/main">
+    <mc:Choice Requires="p14">
       <p:transition spd="slow" p14:dur="2000" advTm="4531"/>
     </mc:Choice>
-    <mc:Fallback>
+    <mc:Fallback xmlns="">
       <p:transition spd="slow" advTm="4531"/>
     </mc:Fallback>
   </mc:AlternateContent>
@@ -4359,11 +4359,11 @@
   <p:clrMapOvr>
     <a:masterClrMapping/>
   </p:clrMapOvr>
-  <mc:AlternateContent xmlns:mc="http://schemas.openxmlformats.org/markup-compatibility/2006">
-    <mc:Choice xmlns:p14="http://schemas.microsoft.com/office/powerpoint/2010/main" Requires="p14">
+  <mc:AlternateContent xmlns:mc="http://schemas.openxmlformats.org/markup-compatibility/2006" xmlns:p14="http://schemas.microsoft.com/office/powerpoint/2010/main">
+    <mc:Choice Requires="p14">
       <p:transition spd="slow" p14:dur="2000" advTm="2279"/>
     </mc:Choice>
-    <mc:Fallback>
+    <mc:Fallback xmlns="">
       <p:transition spd="slow" advTm="2279"/>
     </mc:Fallback>
   </mc:AlternateContent>
@@ -4497,7 +4497,7 @@
           <a:p>
             <a:r>
               <a:rPr lang="en-US" altLang="zh-Hans-HK" dirty="0"/>
-              <a:t>Case</a:t>
+              <a:t>Findings</a:t>
             </a:r>
             <a:endParaRPr lang="zh-Hans-HK" altLang="en-US" dirty="0"/>
           </a:p>

</xml_diff>